<commit_message>
add video link at first page
</commit_message>
<xml_diff>
--- a/sprint-presentations/SYNPHONY_sprint_2.pptx
+++ b/sprint-presentations/SYNPHONY_sprint_2.pptx
@@ -245,7 +245,7 @@
           <a:p>
             <a:fld id="{CDA3C146-E2BA-41EA-8AE9-0C67692768F2}" type="datetimeFigureOut">
               <a:rPr lang="en-US" smtClean="0"/>
-              <a:t>11/18/2019</a:t>
+              <a:t>11/18/19</a:t>
             </a:fld>
             <a:endParaRPr lang="en-US" dirty="0"/>
           </a:p>
@@ -422,7 +422,7 @@
           <a:p>
             <a:fld id="{1F7D3EB6-8099-4744-9273-C8C1DD61A2EA}" type="datetimeFigureOut">
               <a:rPr lang="en-US" noProof="0" smtClean="0"/>
-              <a:t>11/18/2019</a:t>
+              <a:t>11/18/19</a:t>
             </a:fld>
             <a:endParaRPr lang="en-US" noProof="0" dirty="0"/>
           </a:p>
@@ -43869,7 +43869,9 @@
         </p:nvSpPr>
         <p:spPr/>
         <p:txBody>
-          <a:bodyPr/>
+          <a:bodyPr>
+            <a:normAutofit/>
+          </a:bodyPr>
           <a:lstStyle/>
           <a:p>
             <a:r>
@@ -43879,7 +43881,22 @@
             <a:br>
               <a:rPr lang="en-US" dirty="0"/>
             </a:br>
-            <a:endParaRPr lang="ru-RU" dirty="0"/>
+            <a:r>
+              <a:rPr lang="en-US" sz="1600" dirty="0">
+                <a:hlinkClick r:id="rId2">
+                  <a:extLst>
+                    <a:ext uri="{A12FA001-AC4F-418D-AE19-62706E023703}">
+                      <ahyp:hlinkClr xmlns:ahyp="http://schemas.microsoft.com/office/drawing/2018/hyperlinkcolor" val="tx"/>
+                    </a:ext>
+                  </a:extLst>
+                </a:hlinkClick>
+              </a:rPr>
+              <a:t>https://drive.google.com/file/d/10GV5tnV7R4H9M3GCqD53sowEQ1Ip0s7b/view?usp=sharing</a:t>
+            </a:r>
+            <a:br>
+              <a:rPr lang="en-US" sz="1600" dirty="0"/>
+            </a:br>
+            <a:endParaRPr lang="ru-RU" sz="1600" dirty="0"/>
           </a:p>
         </p:txBody>
       </p:sp>
@@ -47117,23 +47134,6 @@
 </file>
 
 <file path=customXml/item1.xml><?xml version="1.0" encoding="utf-8"?>
-<p:properties xmlns:p="http://schemas.microsoft.com/office/2006/metadata/properties" xmlns:xsi="http://www.w3.org/2001/XMLSchema-instance" xmlns:pc="http://schemas.microsoft.com/office/infopath/2007/PartnerControls">
-  <documentManagement>
-    <MediaServiceKeyPoints xmlns="71af3243-3dd4-4a8d-8c0d-dd76da1f02a5" xsi:nil="true"/>
-  </documentManagement>
-</p:properties>
-</file>
-
-<file path=customXml/item2.xml><?xml version="1.0" encoding="utf-8"?>
-<?mso-contentType ?>
-<FormTemplates xmlns="http://schemas.microsoft.com/sharepoint/v3/contenttype/forms">
-  <Display>DocumentLibraryForm</Display>
-  <Edit>DocumentLibraryForm</Edit>
-  <New>DocumentLibraryForm</New>
-</FormTemplates>
-</file>
-
-<file path=customXml/item3.xml><?xml version="1.0" encoding="utf-8"?>
 <ct:contentTypeSchema xmlns:ct="http://schemas.microsoft.com/office/2006/metadata/contentType" xmlns:ma="http://schemas.microsoft.com/office/2006/metadata/properties/metaAttributes" ct:_="" ma:_="" ma:contentTypeName="Document" ma:contentTypeID="0x01010079F111ED35F8CC479449609E8A0923A6" ma:contentTypeVersion="11" ma:contentTypeDescription="Create a new document." ma:contentTypeScope="" ma:versionID="96291512c1ee715ab617f4c07df79fc1">
   <xsd:schema xmlns:xsd="http://www.w3.org/2001/XMLSchema" xmlns:xs="http://www.w3.org/2001/XMLSchema" xmlns:p="http://schemas.microsoft.com/office/2006/metadata/properties" xmlns:ns2="71af3243-3dd4-4a8d-8c0d-dd76da1f02a5" xmlns:ns3="16c05727-aa75-4e4a-9b5f-8a80a1165891" targetNamespace="http://schemas.microsoft.com/office/2006/metadata/properties" ma:root="true" ma:fieldsID="8256c27c40ca5c40ce1cf6c44f0205df" ns2:_="" ns3:_="">
     <xsd:import namespace="71af3243-3dd4-4a8d-8c0d-dd76da1f02a5"/>
@@ -47344,25 +47344,24 @@
 </ct:contentTypeSchema>
 </file>
 
-<file path=customXml/itemProps1.xml><?xml version="1.0" encoding="utf-8"?>
-<ds:datastoreItem xmlns:ds="http://schemas.openxmlformats.org/officeDocument/2006/customXml" ds:itemID="{D726A944-A9F4-4295-9B5E-C397EB1318B9}">
-  <ds:schemaRefs>
-    <ds:schemaRef ds:uri="http://schemas.microsoft.com/office/2006/metadata/properties"/>
-    <ds:schemaRef ds:uri="http://schemas.microsoft.com/office/infopath/2007/PartnerControls"/>
-    <ds:schemaRef ds:uri="71af3243-3dd4-4a8d-8c0d-dd76da1f02a5"/>
-  </ds:schemaRefs>
-</ds:datastoreItem>
+<file path=customXml/item2.xml><?xml version="1.0" encoding="utf-8"?>
+<p:properties xmlns:p="http://schemas.microsoft.com/office/2006/metadata/properties" xmlns:xsi="http://www.w3.org/2001/XMLSchema-instance" xmlns:pc="http://schemas.microsoft.com/office/infopath/2007/PartnerControls">
+  <documentManagement>
+    <MediaServiceKeyPoints xmlns="71af3243-3dd4-4a8d-8c0d-dd76da1f02a5" xsi:nil="true"/>
+  </documentManagement>
+</p:properties>
 </file>
 
-<file path=customXml/itemProps2.xml><?xml version="1.0" encoding="utf-8"?>
-<ds:datastoreItem xmlns:ds="http://schemas.openxmlformats.org/officeDocument/2006/customXml" ds:itemID="{01743C61-8CA7-48FF-B2A3-6055DA854CF6}">
-  <ds:schemaRefs>
-    <ds:schemaRef ds:uri="http://schemas.microsoft.com/sharepoint/v3/contenttype/forms"/>
-  </ds:schemaRefs>
-</ds:datastoreItem>
+<file path=customXml/item3.xml><?xml version="1.0" encoding="utf-8"?>
+<?mso-contentType ?>
+<FormTemplates xmlns="http://schemas.microsoft.com/sharepoint/v3/contenttype/forms">
+  <Display>DocumentLibraryForm</Display>
+  <Edit>DocumentLibraryForm</Edit>
+  <New>DocumentLibraryForm</New>
+</FormTemplates>
 </file>
 
-<file path=customXml/itemProps3.xml><?xml version="1.0" encoding="utf-8"?>
+<file path=customXml/itemProps1.xml><?xml version="1.0" encoding="utf-8"?>
 <ds:datastoreItem xmlns:ds="http://schemas.openxmlformats.org/officeDocument/2006/customXml" ds:itemID="{472965D8-9C19-4E48-8421-5D6B21FC440C}">
   <ds:schemaRefs>
     <ds:schemaRef ds:uri="http://schemas.microsoft.com/office/2006/metadata/contentType"/>
@@ -47379,4 +47378,22 @@
     <ds:schemaRef ds:uri="http://schemas.microsoft.com/internal/obd"/>
   </ds:schemaRefs>
 </ds:datastoreItem>
+</file>
+
+<file path=customXml/itemProps2.xml><?xml version="1.0" encoding="utf-8"?>
+<ds:datastoreItem xmlns:ds="http://schemas.openxmlformats.org/officeDocument/2006/customXml" ds:itemID="{D726A944-A9F4-4295-9B5E-C397EB1318B9}">
+  <ds:schemaRefs>
+    <ds:schemaRef ds:uri="http://schemas.microsoft.com/office/2006/metadata/properties"/>
+    <ds:schemaRef ds:uri="http://schemas.microsoft.com/office/infopath/2007/PartnerControls"/>
+    <ds:schemaRef ds:uri="71af3243-3dd4-4a8d-8c0d-dd76da1f02a5"/>
+  </ds:schemaRefs>
+</ds:datastoreItem>
+</file>
+
+<file path=customXml/itemProps3.xml><?xml version="1.0" encoding="utf-8"?>
+<ds:datastoreItem xmlns:ds="http://schemas.openxmlformats.org/officeDocument/2006/customXml" ds:itemID="{01743C61-8CA7-48FF-B2A3-6055DA854CF6}">
+  <ds:schemaRefs>
+    <ds:schemaRef ds:uri="http://schemas.microsoft.com/sharepoint/v3/contenttype/forms"/>
+  </ds:schemaRefs>
+</ds:datastoreItem>
 </file>
</xml_diff>